<commit_message>
add micro-feb15afternoon.pptx & variants
</commit_message>
<xml_diff>
--- a/spring13/slides13/micro-feb15.pptx
+++ b/spring13/slides13/micro-feb15.pptx
@@ -2403,7 +2403,7 @@
         <p:spPr>
           <a:xfrm>
             <a:off x="304801" y="1549400"/>
-            <a:ext cx="8702020" cy="5386090"/>
+            <a:ext cx="8702020" cy="3354765"/>
           </a:xfrm>
           <a:prstGeom prst="rect">
             <a:avLst/>
@@ -2680,77 +2680,9 @@
               </a:rPr>
               <a:t>?</a:t>
             </a:r>
-          </a:p>
-          <a:p>
-            <a:pPr algn="l"/>
-            <a:r>
-              <a:rPr lang="en-US" sz="3600" dirty="0" smtClean="0">
-                <a:latin typeface="Comic Sans MS" pitchFamily="66" charset="0"/>
-              </a:rPr>
-              <a:t>4. </a:t>
-            </a:r>
-            <a:r>
-              <a:rPr lang="en-US" sz="4400" dirty="0" smtClean="0">
-                <a:latin typeface="Comic Sans MS" pitchFamily="66" charset="0"/>
-              </a:rPr>
-              <a:t>This </a:t>
-            </a:r>
-            <a:r>
-              <a:rPr lang="en-US" sz="4400" dirty="0">
-                <a:latin typeface="Comic Sans MS" pitchFamily="66" charset="0"/>
-              </a:rPr>
-              <a:t>formula </a:t>
-            </a:r>
-            <a:r>
-              <a:rPr lang="en-US" sz="4400" dirty="0" smtClean="0">
-                <a:latin typeface="Comic Sans MS" pitchFamily="66" charset="0"/>
-              </a:rPr>
-              <a:t>is equivalent to</a:t>
-            </a:r>
-          </a:p>
-          <a:p>
-            <a:r>
-              <a:rPr lang="en-US" sz="4400" dirty="0">
-                <a:solidFill>
-                  <a:schemeClr val="accent1">
-                    <a:lumMod val="50000"/>
-                  </a:schemeClr>
-                </a:solidFill>
-                <a:latin typeface="Comic Sans MS" pitchFamily="66" charset="0"/>
-              </a:rPr>
-              <a:t>(P </a:t>
-            </a:r>
-            <a:r>
-              <a:rPr lang="en-US" dirty="0" smtClean="0">
-                <a:solidFill>
-                  <a:schemeClr val="accent1">
-                    <a:lumMod val="50000"/>
-                  </a:schemeClr>
-                </a:solidFill>
-                <a:latin typeface="Comic Sans MS" pitchFamily="66" charset="0"/>
-              </a:rPr>
-              <a:t>◆</a:t>
-            </a:r>
-            <a:r>
-              <a:rPr lang="en-US" sz="4400" dirty="0" smtClean="0">
-                <a:solidFill>
-                  <a:schemeClr val="accent1">
-                    <a:lumMod val="50000"/>
-                  </a:schemeClr>
-                </a:solidFill>
-                <a:latin typeface="Comic Sans MS" pitchFamily="66" charset="0"/>
-              </a:rPr>
-              <a:t> Q)</a:t>
-            </a:r>
-          </a:p>
-          <a:p>
-            <a:pPr algn="l"/>
-            <a:r>
-              <a:rPr lang="en-US" sz="4400" dirty="0" smtClean="0">
-                <a:latin typeface="Comic Sans MS" pitchFamily="66" charset="0"/>
-              </a:rPr>
-              <a:t>   for propositional operator: ?</a:t>
-            </a:r>
+            <a:endParaRPr lang="en-US" sz="4400" dirty="0" smtClean="0">
+              <a:latin typeface="Comic Sans MS" pitchFamily="66" charset="0"/>
+            </a:endParaRPr>
           </a:p>
           <a:p>
             <a:pPr algn="l"/>
@@ -2773,6 +2705,13 @@
   <p:transition xmlns:p14="http://schemas.microsoft.com/office/powerpoint/2010/main">
     <p:fade/>
   </p:transition>
+  <p:timing>
+    <p:tnLst>
+      <p:par>
+        <p:cTn xmlns:p14="http://schemas.microsoft.com/office/powerpoint/2010/main" id="1" dur="indefinite" restart="never" nodeType="tmRoot"/>
+      </p:par>
+    </p:tnLst>
+  </p:timing>
 </p:sld>
 </file>
 
@@ -6531,20 +6470,6 @@
                         </a:rPr>
                         <a:t>T</a:t>
                       </a:r>
-                      <a:endParaRPr kumimoji="0" lang="en-US" sz="3600" b="0" i="0" u="none" strike="noStrike" kern="1200" cap="none" spc="0" normalizeH="0" baseline="0" noProof="0" dirty="0" smtClean="0">
-                        <a:ln>
-                          <a:noFill/>
-                        </a:ln>
-                        <a:solidFill>
-                          <a:srgbClr val="006600"/>
-                        </a:solidFill>
-                        <a:effectLst/>
-                        <a:uLnTx/>
-                        <a:uFillTx/>
-                        <a:latin typeface="Comic Sans MS"/>
-                        <a:ea typeface="+mn-ea"/>
-                        <a:cs typeface="Comic Sans MS"/>
-                      </a:endParaRPr>
                     </a:p>
                   </a:txBody>
                   <a:tcPr anchor="ctr"/>

</xml_diff>

<commit_message>
edit micro-feb15.pptx & -afternoon.pptx, typo well_ordering, typo PS_disjoint_cartesian_products
</commit_message>
<xml_diff>
--- a/spring13/slides13/micro-feb15.pptx
+++ b/spring13/slides13/micro-feb15.pptx
@@ -12,7 +12,7 @@
   </p:handoutMasterIdLst>
   <p:sldIdLst>
     <p:sldId id="465" r:id="rId2"/>
-    <p:sldId id="464" r:id="rId3"/>
+    <p:sldId id="467" r:id="rId3"/>
     <p:sldId id="466" r:id="rId4"/>
   </p:sldIdLst>
   <p:sldSz cx="9144000" cy="6858000" type="screen4x3"/>
@@ -2680,9 +2680,6 @@
               </a:rPr>
               <a:t>?</a:t>
             </a:r>
-            <a:endParaRPr lang="en-US" sz="4400" dirty="0" smtClean="0">
-              <a:latin typeface="Comic Sans MS" pitchFamily="66" charset="0"/>
-            </a:endParaRPr>
           </a:p>
           <a:p>
             <a:pPr algn="l"/>
@@ -2878,50 +2875,6 @@
       </p:grpSp>
       <p:sp>
         <p:nvSpPr>
-          <p:cNvPr id="89" name="Title 88"/>
-          <p:cNvSpPr>
-            <a:spLocks noGrp="1"/>
-          </p:cNvSpPr>
-          <p:nvPr>
-            <p:ph type="title" sz="quarter"/>
-          </p:nvPr>
-        </p:nvSpPr>
-        <p:spPr>
-          <a:xfrm>
-            <a:off x="2411288" y="301893"/>
-            <a:ext cx="4667607" cy="1002925"/>
-          </a:xfrm>
-        </p:spPr>
-        <p:txBody>
-          <a:bodyPr/>
-          <a:lstStyle/>
-          <a:p>
-            <a:r>
-              <a:rPr lang="en-US" sz="3600" dirty="0" err="1" smtClean="0">
-                <a:solidFill>
-                  <a:schemeClr val="tx1"/>
-                </a:solidFill>
-              </a:rPr>
-              <a:t>Microquiz</a:t>
-            </a:r>
-            <a:r>
-              <a:rPr lang="en-US" sz="3600" dirty="0" smtClean="0">
-                <a:solidFill>
-                  <a:schemeClr val="tx1"/>
-                </a:solidFill>
-              </a:rPr>
-              <a:t> Feb 15</a:t>
-            </a:r>
-            <a:endParaRPr lang="en-US" sz="3600" dirty="0">
-              <a:solidFill>
-                <a:schemeClr val="tx1"/>
-              </a:solidFill>
-            </a:endParaRPr>
-          </a:p>
-        </p:txBody>
-      </p:sp>
-      <p:sp>
-        <p:nvSpPr>
           <p:cNvPr id="47" name="Rectangle 11"/>
           <p:cNvSpPr>
             <a:spLocks noGrp="1" noChangeArrowheads="1"/>
@@ -2989,7 +2942,7 @@
           <p:nvPr>
             <p:extLst>
               <p:ext uri="{D42A27DB-BD31-4B8C-83A1-F6EECF244321}">
-                <p14:modId xmlns:p14="http://schemas.microsoft.com/office/powerpoint/2010/main" val="413364011"/>
+                <p14:modId xmlns:p14="http://schemas.microsoft.com/office/powerpoint/2010/main" val="1645310598"/>
               </p:ext>
             </p:extLst>
           </p:nvPr>
@@ -4587,10 +4540,116 @@
           </a:graphicData>
         </a:graphic>
       </p:graphicFrame>
+      <p:sp>
+        <p:nvSpPr>
+          <p:cNvPr id="3" name="TextBox 2"/>
+          <p:cNvSpPr txBox="1"/>
+          <p:nvPr/>
+        </p:nvSpPr>
+        <p:spPr>
+          <a:xfrm>
+            <a:off x="1312863" y="279400"/>
+            <a:ext cx="7653337" cy="1446550"/>
+          </a:xfrm>
+          <a:prstGeom prst="rect">
+            <a:avLst/>
+          </a:prstGeom>
+          <a:noFill/>
+        </p:spPr>
+        <p:txBody>
+          <a:bodyPr wrap="square" rtlCol="0">
+            <a:spAutoFit/>
+          </a:bodyPr>
+          <a:lstStyle/>
+          <a:p>
+            <a:pPr algn="l"/>
+            <a:r>
+              <a:rPr lang="en-US" dirty="0" smtClean="0">
+                <a:latin typeface="Comic Sans MS" pitchFamily="66" charset="0"/>
+              </a:rPr>
+              <a:t>name:</a:t>
+            </a:r>
+          </a:p>
+          <a:p>
+            <a:pPr algn="l"/>
+            <a:r>
+              <a:rPr lang="en-US" sz="2800" dirty="0" smtClean="0">
+                <a:latin typeface="Comic Sans MS" pitchFamily="66" charset="0"/>
+              </a:rPr>
+              <a:t>2.</a:t>
+            </a:r>
+            <a:r>
+              <a:rPr lang="en-US" sz="2800" dirty="0" smtClean="0">
+                <a:solidFill>
+                  <a:srgbClr val="006600"/>
+                </a:solidFill>
+                <a:latin typeface="Comic Sans MS" pitchFamily="66" charset="0"/>
+              </a:rPr>
+              <a:t>Y</a:t>
+            </a:r>
+            <a:r>
+              <a:rPr lang="en-US" sz="2800" dirty="0" smtClean="0">
+                <a:latin typeface="Comic Sans MS" pitchFamily="66" charset="0"/>
+              </a:rPr>
+              <a:t> </a:t>
+            </a:r>
+            <a:r>
+              <a:rPr lang="en-US" sz="2800" dirty="0" smtClean="0">
+                <a:solidFill>
+                  <a:schemeClr val="accent2"/>
+                </a:solidFill>
+                <a:latin typeface="Comic Sans MS" pitchFamily="66" charset="0"/>
+              </a:rPr>
+              <a:t>N</a:t>
+            </a:r>
+            <a:r>
+              <a:rPr lang="en-US" sz="2800" dirty="0" smtClean="0">
+                <a:latin typeface="Comic Sans MS" pitchFamily="66" charset="0"/>
+              </a:rPr>
+              <a:t>  3.</a:t>
+            </a:r>
+            <a:r>
+              <a:rPr lang="en-US" sz="2800" dirty="0" smtClean="0">
+                <a:solidFill>
+                  <a:srgbClr val="006600"/>
+                </a:solidFill>
+                <a:latin typeface="Comic Sans MS" pitchFamily="66" charset="0"/>
+              </a:rPr>
+              <a:t>Y</a:t>
+            </a:r>
+            <a:r>
+              <a:rPr lang="en-US" sz="2800" dirty="0" smtClean="0">
+                <a:latin typeface="Comic Sans MS" pitchFamily="66" charset="0"/>
+              </a:rPr>
+              <a:t> </a:t>
+            </a:r>
+            <a:r>
+              <a:rPr lang="en-US" sz="2800" dirty="0" smtClean="0">
+                <a:solidFill>
+                  <a:schemeClr val="accent2"/>
+                </a:solidFill>
+                <a:latin typeface="Comic Sans MS" pitchFamily="66" charset="0"/>
+              </a:rPr>
+              <a:t>N</a:t>
+            </a:r>
+          </a:p>
+          <a:p>
+            <a:pPr algn="l"/>
+            <a:endParaRPr lang="en-US" sz="2800" dirty="0" smtClean="0">
+              <a:solidFill>
+                <a:schemeClr val="accent1">
+                  <a:lumMod val="50000"/>
+                </a:schemeClr>
+              </a:solidFill>
+              <a:latin typeface="Comic Sans MS" pitchFamily="66" charset="0"/>
+            </a:endParaRPr>
+          </a:p>
+        </p:txBody>
+      </p:sp>
     </p:spTree>
     <p:extLst>
       <p:ext uri="{BB962C8B-B14F-4D97-AF65-F5344CB8AC3E}">
-        <p14:creationId xmlns:p14="http://schemas.microsoft.com/office/powerpoint/2010/main" val="3892997098"/>
+        <p14:creationId xmlns:p14="http://schemas.microsoft.com/office/powerpoint/2010/main" val="3956698703"/>
       </p:ext>
     </p:extLst>
   </p:cSld>
@@ -4782,50 +4841,6 @@
       </p:grpSp>
       <p:sp>
         <p:nvSpPr>
-          <p:cNvPr id="89" name="Title 88"/>
-          <p:cNvSpPr>
-            <a:spLocks noGrp="1"/>
-          </p:cNvSpPr>
-          <p:nvPr>
-            <p:ph type="title" sz="quarter"/>
-          </p:nvPr>
-        </p:nvSpPr>
-        <p:spPr>
-          <a:xfrm>
-            <a:off x="2411288" y="301893"/>
-            <a:ext cx="4667607" cy="1002925"/>
-          </a:xfrm>
-        </p:spPr>
-        <p:txBody>
-          <a:bodyPr/>
-          <a:lstStyle/>
-          <a:p>
-            <a:r>
-              <a:rPr lang="en-US" sz="3600" dirty="0" err="1" smtClean="0">
-                <a:solidFill>
-                  <a:schemeClr val="tx1"/>
-                </a:solidFill>
-              </a:rPr>
-              <a:t>Microquiz</a:t>
-            </a:r>
-            <a:r>
-              <a:rPr lang="en-US" sz="3600" dirty="0" smtClean="0">
-                <a:solidFill>
-                  <a:schemeClr val="tx1"/>
-                </a:solidFill>
-              </a:rPr>
-              <a:t> Feb 15</a:t>
-            </a:r>
-            <a:endParaRPr lang="en-US" sz="3600" dirty="0">
-              <a:solidFill>
-                <a:schemeClr val="tx1"/>
-              </a:solidFill>
-            </a:endParaRPr>
-          </a:p>
-        </p:txBody>
-      </p:sp>
-      <p:sp>
-        <p:nvSpPr>
           <p:cNvPr id="47" name="Rectangle 11"/>
           <p:cNvSpPr>
             <a:spLocks noGrp="1" noChangeArrowheads="1"/>
@@ -4893,14 +4908,14 @@
           <p:nvPr>
             <p:extLst>
               <p:ext uri="{D42A27DB-BD31-4B8C-83A1-F6EECF244321}">
-                <p14:modId xmlns:p14="http://schemas.microsoft.com/office/powerpoint/2010/main" val="1899512897"/>
+                <p14:modId xmlns:p14="http://schemas.microsoft.com/office/powerpoint/2010/main" val="3641718499"/>
               </p:ext>
             </p:extLst>
           </p:nvPr>
         </p:nvGraphicFramePr>
         <p:xfrm>
           <a:off x="596900" y="1511304"/>
-          <a:ext cx="7861300" cy="5084907"/>
+          <a:ext cx="7861300" cy="3208590"/>
         </p:xfrm>
         <a:graphic>
           <a:graphicData uri="http://schemas.openxmlformats.org/drawingml/2006/table">
@@ -5494,7 +5509,7 @@
                           <a:ea typeface="+mn-ea"/>
                           <a:cs typeface="Comic Sans MS"/>
                         </a:rPr>
-                        <a:t>OR</a:t>
+                        <a:t>XOR</a:t>
                       </a:r>
                     </a:p>
                   </a:txBody>
@@ -6453,23 +6468,20 @@
                         <a:tabLst/>
                         <a:defRPr/>
                       </a:pPr>
-                      <a:r>
-                        <a:rPr kumimoji="0" lang="en-US" sz="3600" b="0" i="0" u="none" strike="noStrike" kern="1200" cap="none" spc="0" normalizeH="0" baseline="0" noProof="0" dirty="0" smtClean="0">
-                          <a:ln>
-                            <a:noFill/>
-                          </a:ln>
-                          <a:solidFill>
-                            <a:srgbClr val="006600"/>
-                          </a:solidFill>
-                          <a:effectLst/>
-                          <a:uLnTx/>
-                          <a:uFillTx/>
-                          <a:latin typeface="Comic Sans MS"/>
-                          <a:ea typeface="+mn-ea"/>
-                          <a:cs typeface="Comic Sans MS"/>
-                        </a:rPr>
-                        <a:t>T</a:t>
-                      </a:r>
+                      <a:endParaRPr kumimoji="0" lang="en-US" sz="3600" b="0" i="0" u="none" strike="noStrike" kern="1200" cap="none" spc="0" normalizeH="0" baseline="0" noProof="0" dirty="0" smtClean="0">
+                        <a:ln>
+                          <a:noFill/>
+                        </a:ln>
+                        <a:solidFill>
+                          <a:srgbClr val="006600"/>
+                        </a:solidFill>
+                        <a:effectLst/>
+                        <a:uLnTx/>
+                        <a:uFillTx/>
+                        <a:latin typeface="Comic Sans MS"/>
+                        <a:ea typeface="+mn-ea"/>
+                        <a:cs typeface="Comic Sans MS"/>
+                      </a:endParaRPr>
                     </a:p>
                   </a:txBody>
                   <a:tcPr anchor="ctr"/>
@@ -6842,402 +6854,6 @@
                     <a:bodyPr/>
                     <a:lstStyle/>
                     <a:p>
-                      <a:endParaRPr lang="en-US"/>
-                    </a:p>
-                  </a:txBody>
-                  <a:tcPr anchor="ctr"/>
-                </a:tc>
-              </a:tr>
-              <a:tr h="625439">
-                <a:tc>
-                  <a:txBody>
-                    <a:bodyPr/>
-                    <a:lstStyle/>
-                    <a:p>
-                      <a:endParaRPr lang="en-US" dirty="0"/>
-                    </a:p>
-                  </a:txBody>
-                  <a:tcPr anchor="ctr"/>
-                </a:tc>
-                <a:tc>
-                  <a:txBody>
-                    <a:bodyPr/>
-                    <a:lstStyle/>
-                    <a:p>
-                      <a:endParaRPr lang="en-US" dirty="0"/>
-                    </a:p>
-                  </a:txBody>
-                  <a:tcPr anchor="ctr">
-                    <a:lnR w="28575" cap="flat" cmpd="sng" algn="ctr">
-                      <a:solidFill>
-                        <a:scrgbClr r="0" g="0" b="0"/>
-                      </a:solidFill>
-                      <a:prstDash val="solid"/>
-                      <a:round/>
-                      <a:headEnd type="none" w="med" len="med"/>
-                      <a:tailEnd type="none" w="med" len="med"/>
-                    </a:lnR>
-                  </a:tcPr>
-                </a:tc>
-                <a:tc>
-                  <a:txBody>
-                    <a:bodyPr/>
-                    <a:lstStyle/>
-                    <a:p>
-                      <a:endParaRPr lang="en-US"/>
-                    </a:p>
-                  </a:txBody>
-                  <a:tcPr anchor="ctr">
-                    <a:lnL w="28575" cap="flat" cmpd="sng" algn="ctr">
-                      <a:solidFill>
-                        <a:scrgbClr r="0" g="0" b="0"/>
-                      </a:solidFill>
-                      <a:prstDash val="solid"/>
-                      <a:round/>
-                      <a:headEnd type="none" w="med" len="med"/>
-                      <a:tailEnd type="none" w="med" len="med"/>
-                    </a:lnL>
-                  </a:tcPr>
-                </a:tc>
-                <a:tc>
-                  <a:txBody>
-                    <a:bodyPr/>
-                    <a:lstStyle/>
-                    <a:p>
-                      <a:endParaRPr lang="en-US"/>
-                    </a:p>
-                  </a:txBody>
-                  <a:tcPr anchor="ctr"/>
-                </a:tc>
-                <a:tc>
-                  <a:txBody>
-                    <a:bodyPr/>
-                    <a:lstStyle/>
-                    <a:p>
-                      <a:endParaRPr lang="en-US"/>
-                    </a:p>
-                  </a:txBody>
-                  <a:tcPr anchor="ctr"/>
-                </a:tc>
-                <a:tc>
-                  <a:txBody>
-                    <a:bodyPr/>
-                    <a:lstStyle/>
-                    <a:p>
-                      <a:endParaRPr lang="en-US"/>
-                    </a:p>
-                  </a:txBody>
-                  <a:tcPr anchor="ctr"/>
-                </a:tc>
-                <a:tc>
-                  <a:txBody>
-                    <a:bodyPr/>
-                    <a:lstStyle/>
-                    <a:p>
-                      <a:endParaRPr lang="en-US"/>
-                    </a:p>
-                  </a:txBody>
-                  <a:tcPr anchor="ctr"/>
-                </a:tc>
-                <a:tc>
-                  <a:txBody>
-                    <a:bodyPr/>
-                    <a:lstStyle/>
-                    <a:p>
-                      <a:endParaRPr lang="en-US"/>
-                    </a:p>
-                  </a:txBody>
-                  <a:tcPr anchor="ctr"/>
-                </a:tc>
-                <a:tc>
-                  <a:txBody>
-                    <a:bodyPr/>
-                    <a:lstStyle/>
-                    <a:p>
-                      <a:endParaRPr lang="en-US"/>
-                    </a:p>
-                  </a:txBody>
-                  <a:tcPr anchor="ctr"/>
-                </a:tc>
-                <a:tc>
-                  <a:txBody>
-                    <a:bodyPr/>
-                    <a:lstStyle/>
-                    <a:p>
-                      <a:endParaRPr lang="en-US" dirty="0"/>
-                    </a:p>
-                  </a:txBody>
-                  <a:tcPr anchor="ctr"/>
-                </a:tc>
-                <a:tc>
-                  <a:txBody>
-                    <a:bodyPr/>
-                    <a:lstStyle/>
-                    <a:p>
-                      <a:endParaRPr lang="en-US" dirty="0"/>
-                    </a:p>
-                  </a:txBody>
-                  <a:tcPr anchor="ctr"/>
-                </a:tc>
-              </a:tr>
-              <a:tr h="625439">
-                <a:tc>
-                  <a:txBody>
-                    <a:bodyPr/>
-                    <a:lstStyle/>
-                    <a:p>
-                      <a:endParaRPr lang="en-US" dirty="0"/>
-                    </a:p>
-                  </a:txBody>
-                  <a:tcPr anchor="ctr"/>
-                </a:tc>
-                <a:tc>
-                  <a:txBody>
-                    <a:bodyPr/>
-                    <a:lstStyle/>
-                    <a:p>
-                      <a:endParaRPr lang="en-US" dirty="0"/>
-                    </a:p>
-                  </a:txBody>
-                  <a:tcPr anchor="ctr">
-                    <a:lnR w="28575" cap="flat" cmpd="sng" algn="ctr">
-                      <a:solidFill>
-                        <a:scrgbClr r="0" g="0" b="0"/>
-                      </a:solidFill>
-                      <a:prstDash val="solid"/>
-                      <a:round/>
-                      <a:headEnd type="none" w="med" len="med"/>
-                      <a:tailEnd type="none" w="med" len="med"/>
-                    </a:lnR>
-                  </a:tcPr>
-                </a:tc>
-                <a:tc>
-                  <a:txBody>
-                    <a:bodyPr/>
-                    <a:lstStyle/>
-                    <a:p>
-                      <a:endParaRPr lang="en-US"/>
-                    </a:p>
-                  </a:txBody>
-                  <a:tcPr anchor="ctr">
-                    <a:lnL w="28575" cap="flat" cmpd="sng" algn="ctr">
-                      <a:solidFill>
-                        <a:scrgbClr r="0" g="0" b="0"/>
-                      </a:solidFill>
-                      <a:prstDash val="solid"/>
-                      <a:round/>
-                      <a:headEnd type="none" w="med" len="med"/>
-                      <a:tailEnd type="none" w="med" len="med"/>
-                    </a:lnL>
-                  </a:tcPr>
-                </a:tc>
-                <a:tc>
-                  <a:txBody>
-                    <a:bodyPr/>
-                    <a:lstStyle/>
-                    <a:p>
-                      <a:endParaRPr lang="en-US"/>
-                    </a:p>
-                  </a:txBody>
-                  <a:tcPr anchor="ctr"/>
-                </a:tc>
-                <a:tc>
-                  <a:txBody>
-                    <a:bodyPr/>
-                    <a:lstStyle/>
-                    <a:p>
-                      <a:endParaRPr lang="en-US"/>
-                    </a:p>
-                  </a:txBody>
-                  <a:tcPr anchor="ctr"/>
-                </a:tc>
-                <a:tc>
-                  <a:txBody>
-                    <a:bodyPr/>
-                    <a:lstStyle/>
-                    <a:p>
-                      <a:endParaRPr lang="en-US"/>
-                    </a:p>
-                  </a:txBody>
-                  <a:tcPr anchor="ctr"/>
-                </a:tc>
-                <a:tc>
-                  <a:txBody>
-                    <a:bodyPr/>
-                    <a:lstStyle/>
-                    <a:p>
-                      <a:endParaRPr lang="en-US"/>
-                    </a:p>
-                  </a:txBody>
-                  <a:tcPr anchor="ctr"/>
-                </a:tc>
-                <a:tc>
-                  <a:txBody>
-                    <a:bodyPr/>
-                    <a:lstStyle/>
-                    <a:p>
-                      <a:endParaRPr lang="en-US"/>
-                    </a:p>
-                  </a:txBody>
-                  <a:tcPr anchor="ctr"/>
-                </a:tc>
-                <a:tc>
-                  <a:txBody>
-                    <a:bodyPr/>
-                    <a:lstStyle/>
-                    <a:p>
-                      <a:endParaRPr lang="en-US"/>
-                    </a:p>
-                  </a:txBody>
-                  <a:tcPr anchor="ctr"/>
-                </a:tc>
-                <a:tc>
-                  <a:txBody>
-                    <a:bodyPr/>
-                    <a:lstStyle/>
-                    <a:p>
-                      <a:endParaRPr lang="en-US" dirty="0"/>
-                    </a:p>
-                  </a:txBody>
-                  <a:tcPr anchor="ctr"/>
-                </a:tc>
-                <a:tc>
-                  <a:txBody>
-                    <a:bodyPr/>
-                    <a:lstStyle/>
-                    <a:p>
-                      <a:endParaRPr lang="en-US"/>
-                    </a:p>
-                  </a:txBody>
-                  <a:tcPr anchor="ctr"/>
-                </a:tc>
-              </a:tr>
-              <a:tr h="625439">
-                <a:tc>
-                  <a:txBody>
-                    <a:bodyPr/>
-                    <a:lstStyle/>
-                    <a:p>
-                      <a:endParaRPr lang="en-US" dirty="0"/>
-                    </a:p>
-                  </a:txBody>
-                  <a:tcPr anchor="ctr"/>
-                </a:tc>
-                <a:tc>
-                  <a:txBody>
-                    <a:bodyPr/>
-                    <a:lstStyle/>
-                    <a:p>
-                      <a:endParaRPr lang="en-US" dirty="0"/>
-                    </a:p>
-                  </a:txBody>
-                  <a:tcPr anchor="ctr">
-                    <a:lnR w="28575" cap="flat" cmpd="sng" algn="ctr">
-                      <a:solidFill>
-                        <a:scrgbClr r="0" g="0" b="0"/>
-                      </a:solidFill>
-                      <a:prstDash val="solid"/>
-                      <a:round/>
-                      <a:headEnd type="none" w="med" len="med"/>
-                      <a:tailEnd type="none" w="med" len="med"/>
-                    </a:lnR>
-                  </a:tcPr>
-                </a:tc>
-                <a:tc>
-                  <a:txBody>
-                    <a:bodyPr/>
-                    <a:lstStyle/>
-                    <a:p>
-                      <a:endParaRPr lang="en-US"/>
-                    </a:p>
-                  </a:txBody>
-                  <a:tcPr anchor="ctr">
-                    <a:lnL w="28575" cap="flat" cmpd="sng" algn="ctr">
-                      <a:solidFill>
-                        <a:scrgbClr r="0" g="0" b="0"/>
-                      </a:solidFill>
-                      <a:prstDash val="solid"/>
-                      <a:round/>
-                      <a:headEnd type="none" w="med" len="med"/>
-                      <a:tailEnd type="none" w="med" len="med"/>
-                    </a:lnL>
-                  </a:tcPr>
-                </a:tc>
-                <a:tc>
-                  <a:txBody>
-                    <a:bodyPr/>
-                    <a:lstStyle/>
-                    <a:p>
-                      <a:endParaRPr lang="en-US"/>
-                    </a:p>
-                  </a:txBody>
-                  <a:tcPr anchor="ctr"/>
-                </a:tc>
-                <a:tc>
-                  <a:txBody>
-                    <a:bodyPr/>
-                    <a:lstStyle/>
-                    <a:p>
-                      <a:endParaRPr lang="en-US"/>
-                    </a:p>
-                  </a:txBody>
-                  <a:tcPr anchor="ctr"/>
-                </a:tc>
-                <a:tc>
-                  <a:txBody>
-                    <a:bodyPr/>
-                    <a:lstStyle/>
-                    <a:p>
-                      <a:endParaRPr lang="en-US"/>
-                    </a:p>
-                  </a:txBody>
-                  <a:tcPr anchor="ctr"/>
-                </a:tc>
-                <a:tc>
-                  <a:txBody>
-                    <a:bodyPr/>
-                    <a:lstStyle/>
-                    <a:p>
-                      <a:endParaRPr lang="en-US"/>
-                    </a:p>
-                  </a:txBody>
-                  <a:tcPr anchor="ctr"/>
-                </a:tc>
-                <a:tc>
-                  <a:txBody>
-                    <a:bodyPr/>
-                    <a:lstStyle/>
-                    <a:p>
-                      <a:endParaRPr lang="en-US"/>
-                    </a:p>
-                  </a:txBody>
-                  <a:tcPr anchor="ctr"/>
-                </a:tc>
-                <a:tc>
-                  <a:txBody>
-                    <a:bodyPr/>
-                    <a:lstStyle/>
-                    <a:p>
-                      <a:endParaRPr lang="en-US" dirty="0"/>
-                    </a:p>
-                  </a:txBody>
-                  <a:tcPr anchor="ctr"/>
-                </a:tc>
-                <a:tc>
-                  <a:txBody>
-                    <a:bodyPr/>
-                    <a:lstStyle/>
-                    <a:p>
-                      <a:endParaRPr lang="en-US" dirty="0"/>
-                    </a:p>
-                  </a:txBody>
-                  <a:tcPr anchor="ctr"/>
-                </a:tc>
-                <a:tc>
-                  <a:txBody>
-                    <a:bodyPr/>
-                    <a:lstStyle/>
-                    <a:p>
                       <a:endParaRPr lang="en-US" dirty="0"/>
                     </a:p>
                   </a:txBody>
@@ -7248,6 +6864,286 @@
           </a:graphicData>
         </a:graphic>
       </p:graphicFrame>
+      <p:sp>
+        <p:nvSpPr>
+          <p:cNvPr id="10" name="TextBox 9"/>
+          <p:cNvSpPr txBox="1"/>
+          <p:nvPr/>
+        </p:nvSpPr>
+        <p:spPr>
+          <a:xfrm>
+            <a:off x="1803400" y="5092700"/>
+            <a:ext cx="5158008" cy="1200329"/>
+          </a:xfrm>
+          <a:prstGeom prst="rect">
+            <a:avLst/>
+          </a:prstGeom>
+          <a:noFill/>
+        </p:spPr>
+        <p:txBody>
+          <a:bodyPr wrap="none" rtlCol="0">
+            <a:spAutoFit/>
+          </a:bodyPr>
+          <a:lstStyle/>
+          <a:p>
+            <a:pPr algn="l"/>
+            <a:r>
+              <a:rPr lang="en-US" sz="7200" dirty="0" smtClean="0">
+                <a:latin typeface="Comic Sans MS" pitchFamily="66" charset="0"/>
+              </a:rPr>
+              <a:t>same as </a:t>
+            </a:r>
+            <a:r>
+              <a:rPr lang="en-US" sz="6000" dirty="0" smtClean="0">
+                <a:solidFill>
+                  <a:schemeClr val="accent1">
+                    <a:lumMod val="50000"/>
+                  </a:schemeClr>
+                </a:solidFill>
+                <a:latin typeface="Comic Sans MS" pitchFamily="66" charset="0"/>
+              </a:rPr>
+              <a:t>IFF</a:t>
+            </a:r>
+            <a:endParaRPr lang="en-US" sz="7200" dirty="0" smtClean="0">
+              <a:solidFill>
+                <a:schemeClr val="accent1">
+                  <a:lumMod val="50000"/>
+                </a:schemeClr>
+              </a:solidFill>
+              <a:latin typeface="Comic Sans MS" pitchFamily="66" charset="0"/>
+            </a:endParaRPr>
+          </a:p>
+        </p:txBody>
+      </p:sp>
+      <p:sp>
+        <p:nvSpPr>
+          <p:cNvPr id="11" name="TextBox 10"/>
+          <p:cNvSpPr txBox="1"/>
+          <p:nvPr/>
+        </p:nvSpPr>
+        <p:spPr>
+          <a:xfrm>
+            <a:off x="1312863" y="279400"/>
+            <a:ext cx="7653337" cy="1015663"/>
+          </a:xfrm>
+          <a:prstGeom prst="rect">
+            <a:avLst/>
+          </a:prstGeom>
+          <a:noFill/>
+        </p:spPr>
+        <p:txBody>
+          <a:bodyPr wrap="square" rtlCol="0">
+            <a:spAutoFit/>
+          </a:bodyPr>
+          <a:lstStyle/>
+          <a:p>
+            <a:pPr algn="l"/>
+            <a:r>
+              <a:rPr lang="en-US" dirty="0" smtClean="0">
+                <a:latin typeface="Comic Sans MS" pitchFamily="66" charset="0"/>
+              </a:rPr>
+              <a:t>name:</a:t>
+            </a:r>
+          </a:p>
+          <a:p>
+            <a:pPr algn="l"/>
+            <a:r>
+              <a:rPr lang="en-US" sz="2800" dirty="0" smtClean="0">
+                <a:latin typeface="Comic Sans MS" pitchFamily="66" charset="0"/>
+              </a:rPr>
+              <a:t>2.</a:t>
+            </a:r>
+            <a:r>
+              <a:rPr lang="en-US" sz="2800" dirty="0" smtClean="0">
+                <a:solidFill>
+                  <a:srgbClr val="006600"/>
+                </a:solidFill>
+                <a:latin typeface="Comic Sans MS" pitchFamily="66" charset="0"/>
+              </a:rPr>
+              <a:t>Y</a:t>
+            </a:r>
+            <a:r>
+              <a:rPr lang="en-US" sz="2800" dirty="0" smtClean="0">
+                <a:latin typeface="Comic Sans MS" pitchFamily="66" charset="0"/>
+              </a:rPr>
+              <a:t> </a:t>
+            </a:r>
+            <a:r>
+              <a:rPr lang="en-US" sz="2800" dirty="0" smtClean="0">
+                <a:solidFill>
+                  <a:schemeClr val="accent2"/>
+                </a:solidFill>
+                <a:latin typeface="Comic Sans MS" pitchFamily="66" charset="0"/>
+              </a:rPr>
+              <a:t>N</a:t>
+            </a:r>
+            <a:r>
+              <a:rPr lang="en-US" sz="2800" dirty="0" smtClean="0">
+                <a:latin typeface="Comic Sans MS" pitchFamily="66" charset="0"/>
+              </a:rPr>
+              <a:t>  3.</a:t>
+            </a:r>
+            <a:r>
+              <a:rPr lang="en-US" sz="2800" dirty="0" smtClean="0">
+                <a:solidFill>
+                  <a:srgbClr val="006600"/>
+                </a:solidFill>
+                <a:latin typeface="Comic Sans MS" pitchFamily="66" charset="0"/>
+              </a:rPr>
+              <a:t>Y</a:t>
+            </a:r>
+            <a:r>
+              <a:rPr lang="en-US" sz="2800" dirty="0" smtClean="0">
+                <a:latin typeface="Comic Sans MS" pitchFamily="66" charset="0"/>
+              </a:rPr>
+              <a:t> </a:t>
+            </a:r>
+            <a:r>
+              <a:rPr lang="en-US" sz="2800" dirty="0" smtClean="0">
+                <a:solidFill>
+                  <a:schemeClr val="accent2"/>
+                </a:solidFill>
+                <a:latin typeface="Comic Sans MS" pitchFamily="66" charset="0"/>
+              </a:rPr>
+              <a:t>N</a:t>
+            </a:r>
+            <a:endParaRPr lang="en-US" sz="2800" dirty="0" smtClean="0">
+              <a:solidFill>
+                <a:schemeClr val="accent1">
+                  <a:lumMod val="50000"/>
+                </a:schemeClr>
+              </a:solidFill>
+              <a:latin typeface="Comic Sans MS" pitchFamily="66" charset="0"/>
+            </a:endParaRPr>
+          </a:p>
+        </p:txBody>
+      </p:sp>
+      <p:sp>
+        <p:nvSpPr>
+          <p:cNvPr id="4" name="Decagon 3"/>
+          <p:cNvSpPr/>
+          <p:nvPr/>
+        </p:nvSpPr>
+        <p:spPr bwMode="auto">
+          <a:xfrm>
+            <a:off x="1917700" y="825500"/>
+            <a:ext cx="546100" cy="457200"/>
+          </a:xfrm>
+          <a:prstGeom prst="decagon">
+            <a:avLst/>
+          </a:prstGeom>
+          <a:noFill/>
+          <a:ln w="38100" cap="flat" cmpd="sng" algn="ctr">
+            <a:solidFill>
+              <a:schemeClr val="tx1"/>
+            </a:solidFill>
+            <a:prstDash val="solid"/>
+            <a:round/>
+            <a:headEnd type="none" w="med" len="med"/>
+            <a:tailEnd type="none" w="med" len="med"/>
+          </a:ln>
+          <a:effectLst/>
+        </p:spPr>
+        <p:txBody>
+          <a:bodyPr vert="horz" wrap="none" lIns="91440" tIns="45720" rIns="91440" bIns="45720" numCol="1" rtlCol="0" anchor="ctr" anchorCtr="0" compatLnSpc="1">
+            <a:prstTxWarp prst="textNoShape">
+              <a:avLst/>
+            </a:prstTxWarp>
+          </a:bodyPr>
+          <a:lstStyle/>
+          <a:p>
+            <a:pPr marL="0" marR="0" indent="0" algn="ctr" defTabSz="914400" rtl="0" eaLnBrk="1" fontAlgn="base" latinLnBrk="0" hangingPunct="1">
+              <a:lnSpc>
+                <a:spcPct val="100000"/>
+              </a:lnSpc>
+              <a:spcBef>
+                <a:spcPct val="0"/>
+              </a:spcBef>
+              <a:spcAft>
+                <a:spcPct val="0"/>
+              </a:spcAft>
+              <a:buClrTx/>
+              <a:buSzTx/>
+              <a:buFontTx/>
+              <a:buNone/>
+              <a:tabLst/>
+            </a:pPr>
+            <a:endParaRPr kumimoji="0" lang="en-US" sz="3200" b="0" i="0" u="none" strike="noStrike" cap="none" normalizeH="0" baseline="0" smtClean="0">
+              <a:ln>
+                <a:noFill/>
+              </a:ln>
+              <a:solidFill>
+                <a:schemeClr val="tx1"/>
+              </a:solidFill>
+              <a:effectLst/>
+              <a:latin typeface="Times New Roman" pitchFamily="18" charset="0"/>
+            </a:endParaRPr>
+          </a:p>
+        </p:txBody>
+      </p:sp>
+      <p:sp>
+        <p:nvSpPr>
+          <p:cNvPr id="13" name="Decagon 12"/>
+          <p:cNvSpPr/>
+          <p:nvPr/>
+        </p:nvSpPr>
+        <p:spPr bwMode="auto">
+          <a:xfrm>
+            <a:off x="3035300" y="825500"/>
+            <a:ext cx="546100" cy="457200"/>
+          </a:xfrm>
+          <a:prstGeom prst="decagon">
+            <a:avLst/>
+          </a:prstGeom>
+          <a:noFill/>
+          <a:ln w="38100" cap="flat" cmpd="sng" algn="ctr">
+            <a:solidFill>
+              <a:schemeClr val="tx1"/>
+            </a:solidFill>
+            <a:prstDash val="solid"/>
+            <a:round/>
+            <a:headEnd type="none" w="med" len="med"/>
+            <a:tailEnd type="none" w="med" len="med"/>
+          </a:ln>
+          <a:effectLst/>
+        </p:spPr>
+        <p:txBody>
+          <a:bodyPr vert="horz" wrap="none" lIns="91440" tIns="45720" rIns="91440" bIns="45720" numCol="1" rtlCol="0" anchor="ctr" anchorCtr="0" compatLnSpc="1">
+            <a:prstTxWarp prst="textNoShape">
+              <a:avLst/>
+            </a:prstTxWarp>
+          </a:bodyPr>
+          <a:lstStyle/>
+          <a:p>
+            <a:pPr marL="0" marR="0" indent="0" algn="ctr" defTabSz="914400" rtl="0" eaLnBrk="1" fontAlgn="base" latinLnBrk="0" hangingPunct="1">
+              <a:lnSpc>
+                <a:spcPct val="100000"/>
+              </a:lnSpc>
+              <a:spcBef>
+                <a:spcPct val="0"/>
+              </a:spcBef>
+              <a:spcAft>
+                <a:spcPct val="0"/>
+              </a:spcAft>
+              <a:buClrTx/>
+              <a:buSzTx/>
+              <a:buFontTx/>
+              <a:buNone/>
+              <a:tabLst/>
+            </a:pPr>
+            <a:endParaRPr kumimoji="0" lang="en-US" sz="3200" b="0" i="0" u="none" strike="noStrike" cap="none" normalizeH="0" baseline="0" smtClean="0">
+              <a:ln>
+                <a:noFill/>
+              </a:ln>
+              <a:solidFill>
+                <a:schemeClr val="tx1"/>
+              </a:solidFill>
+              <a:effectLst/>
+              <a:latin typeface="Times New Roman" pitchFamily="18" charset="0"/>
+            </a:endParaRPr>
+          </a:p>
+        </p:txBody>
+      </p:sp>
     </p:spTree>
     <p:extLst>
       <p:ext uri="{BB962C8B-B14F-4D97-AF65-F5344CB8AC3E}">

</xml_diff>